<commit_message>
final presentation; forgotten deploy script
</commit_message>
<xml_diff>
--- a/presentation.pptx
+++ b/presentation.pptx
@@ -17,10 +17,10 @@
   </p:handoutMasterIdLst>
   <p:sldIdLst>
     <p:sldId id="256" r:id="rId7"/>
-    <p:sldId id="315" r:id="rId8"/>
-    <p:sldId id="325" r:id="rId9"/>
-    <p:sldId id="326" r:id="rId10"/>
-    <p:sldId id="324" r:id="rId11"/>
+    <p:sldId id="324" r:id="rId8"/>
+    <p:sldId id="315" r:id="rId9"/>
+    <p:sldId id="325" r:id="rId10"/>
+    <p:sldId id="326" r:id="rId11"/>
   </p:sldIdLst>
   <p:sldSz cx="9144000" cy="6858000" type="screen4x3"/>
   <p:notesSz cx="6985000" cy="9283700"/>
@@ -6897,20 +6897,8 @@
           <a:lstStyle/>
           <a:p>
             <a:r>
-              <a:rPr lang="en-US" dirty="0" err="1" smtClean="0"/>
-              <a:t>DockerCon</a:t>
-            </a:r>
-            <a:r>
               <a:rPr lang="en-US" dirty="0" smtClean="0"/>
-              <a:t> </a:t>
-            </a:r>
-            <a:r>
-              <a:rPr lang="en-US" dirty="0" err="1" smtClean="0"/>
-              <a:t>Hackathon</a:t>
-            </a:r>
-            <a:r>
-              <a:rPr lang="en-US" dirty="0" smtClean="0"/>
-              <a:t/>
+              <a:t>DockerCon Hackathon</a:t>
             </a:r>
             <a:br>
               <a:rPr lang="en-US" dirty="0" smtClean="0"/>
@@ -6948,21 +6936,7 @@
                 <a:latin typeface="Verdana"/>
                 <a:cs typeface="Verdana"/>
               </a:rPr>
-              <a:t>Nikhil </a:t>
-            </a:r>
-            <a:r>
-              <a:rPr lang="en-US" dirty="0" err="1" smtClean="0">
-                <a:latin typeface="Verdana"/>
-                <a:cs typeface="Verdana"/>
-              </a:rPr>
-              <a:t>Vaze</a:t>
-            </a:r>
-            <a:r>
-              <a:rPr lang="en-US" dirty="0" smtClean="0">
-                <a:latin typeface="Verdana"/>
-                <a:cs typeface="Verdana"/>
-              </a:rPr>
-              <a:t>, Siddhartha Gupta, Tanay Nagjee</a:t>
+              <a:t>Nikhil Vaze, Siddhartha Gupta, Tanay Nagjee</a:t>
             </a:r>
           </a:p>
           <a:p>
@@ -7021,6 +6995,469 @@
 </file>
 
 <file path=ppt/slides/slide2.xml><?xml version="1.0" encoding="utf-8"?>
+<p:sld xmlns:a="http://schemas.openxmlformats.org/drawingml/2006/main" xmlns:r="http://schemas.openxmlformats.org/officeDocument/2006/relationships" xmlns:p="http://schemas.openxmlformats.org/presentationml/2006/main">
+  <p:cSld>
+    <p:spTree>
+      <p:nvGrpSpPr>
+        <p:cNvPr id="1" name=""/>
+        <p:cNvGrpSpPr/>
+        <p:nvPr/>
+      </p:nvGrpSpPr>
+      <p:grpSpPr>
+        <a:xfrm>
+          <a:off x="0" y="0"/>
+          <a:ext cx="0" cy="0"/>
+          <a:chOff x="0" y="0"/>
+          <a:chExt cx="0" cy="0"/>
+        </a:xfrm>
+      </p:grpSpPr>
+      <p:sp>
+        <p:nvSpPr>
+          <p:cNvPr id="9" name="Rectangle 8"/>
+          <p:cNvSpPr/>
+          <p:nvPr/>
+        </p:nvSpPr>
+        <p:spPr>
+          <a:xfrm>
+            <a:off x="0" y="1086779"/>
+            <a:ext cx="9144000" cy="5771221"/>
+          </a:xfrm>
+          <a:prstGeom prst="rect">
+            <a:avLst/>
+          </a:prstGeom>
+          <a:solidFill>
+            <a:schemeClr val="bg1"/>
+          </a:solidFill>
+          <a:ln>
+            <a:solidFill>
+              <a:schemeClr val="bg1"/>
+            </a:solidFill>
+          </a:ln>
+          <a:effectLst/>
+        </p:spPr>
+        <p:style>
+          <a:lnRef idx="1">
+            <a:schemeClr val="accent1"/>
+          </a:lnRef>
+          <a:fillRef idx="3">
+            <a:schemeClr val="accent1"/>
+          </a:fillRef>
+          <a:effectRef idx="2">
+            <a:schemeClr val="accent1"/>
+          </a:effectRef>
+          <a:fontRef idx="minor">
+            <a:schemeClr val="lt1"/>
+          </a:fontRef>
+        </p:style>
+        <p:txBody>
+          <a:bodyPr rtlCol="0" anchor="ctr"/>
+          <a:lstStyle/>
+          <a:p>
+            <a:pPr algn="ctr"/>
+            <a:endParaRPr lang="en-US"/>
+          </a:p>
+        </p:txBody>
+      </p:sp>
+      <p:sp>
+        <p:nvSpPr>
+          <p:cNvPr id="2" name="Title 1"/>
+          <p:cNvSpPr>
+            <a:spLocks noGrp="1"/>
+          </p:cNvSpPr>
+          <p:nvPr>
+            <p:ph type="title"/>
+          </p:nvPr>
+        </p:nvSpPr>
+        <p:spPr>
+          <a:xfrm>
+            <a:off x="310891" y="167912"/>
+            <a:ext cx="8375909" cy="767329"/>
+          </a:xfrm>
+        </p:spPr>
+        <p:txBody>
+          <a:bodyPr/>
+          <a:lstStyle/>
+          <a:p>
+            <a:r>
+              <a:rPr lang="en-US" sz="3200" dirty="0" smtClean="0">
+                <a:latin typeface="Verdana"/>
+                <a:cs typeface="Verdana"/>
+              </a:rPr>
+              <a:t>Technologies used</a:t>
+            </a:r>
+            <a:endParaRPr lang="en-US" sz="3200" dirty="0">
+              <a:latin typeface="Verdana"/>
+              <a:cs typeface="Verdana"/>
+            </a:endParaRPr>
+          </a:p>
+        </p:txBody>
+      </p:sp>
+      <p:sp>
+        <p:nvSpPr>
+          <p:cNvPr id="3" name="Content Placeholder 2"/>
+          <p:cNvSpPr>
+            <a:spLocks noGrp="1"/>
+          </p:cNvSpPr>
+          <p:nvPr>
+            <p:ph idx="1"/>
+          </p:nvPr>
+        </p:nvSpPr>
+        <p:spPr>
+          <a:xfrm>
+            <a:off x="310891" y="1342569"/>
+            <a:ext cx="7904571" cy="4637810"/>
+          </a:xfrm>
+        </p:spPr>
+        <p:txBody>
+          <a:bodyPr/>
+          <a:lstStyle/>
+          <a:p>
+            <a:r>
+              <a:rPr lang="en-US" sz="2400" dirty="0" smtClean="0">
+                <a:solidFill>
+                  <a:schemeClr val="tx2"/>
+                </a:solidFill>
+                <a:latin typeface="Verdana"/>
+                <a:cs typeface="Verdana"/>
+              </a:rPr>
+              <a:t>Source </a:t>
+            </a:r>
+            <a:r>
+              <a:rPr lang="en-US" sz="2400" dirty="0">
+                <a:solidFill>
+                  <a:schemeClr val="tx2"/>
+                </a:solidFill>
+                <a:latin typeface="Verdana"/>
+                <a:cs typeface="Verdana"/>
+              </a:rPr>
+              <a:t>control: </a:t>
+            </a:r>
+            <a:r>
+              <a:rPr lang="en-US" sz="2400" dirty="0" err="1" smtClean="0">
+                <a:solidFill>
+                  <a:schemeClr val="tx2"/>
+                </a:solidFill>
+                <a:latin typeface="Verdana"/>
+                <a:cs typeface="Verdana"/>
+              </a:rPr>
+              <a:t>GitHub</a:t>
+            </a:r>
+            <a:endParaRPr lang="en-US" sz="2400" dirty="0">
+              <a:solidFill>
+                <a:schemeClr val="tx2"/>
+              </a:solidFill>
+              <a:latin typeface="Verdana"/>
+              <a:cs typeface="Verdana"/>
+            </a:endParaRPr>
+          </a:p>
+          <a:p>
+            <a:r>
+              <a:rPr lang="en-US" sz="2400" dirty="0" smtClean="0">
+                <a:solidFill>
+                  <a:schemeClr val="tx2"/>
+                </a:solidFill>
+                <a:latin typeface="Verdana"/>
+                <a:cs typeface="Verdana"/>
+              </a:rPr>
+              <a:t>Build</a:t>
+            </a:r>
+            <a:r>
+              <a:rPr lang="en-US" sz="2400" dirty="0">
+                <a:solidFill>
+                  <a:schemeClr val="tx2"/>
+                </a:solidFill>
+                <a:latin typeface="Verdana"/>
+                <a:cs typeface="Verdana"/>
+              </a:rPr>
+              <a:t>: </a:t>
+            </a:r>
+            <a:r>
+              <a:rPr lang="en-US" sz="2400" dirty="0" smtClean="0">
+                <a:solidFill>
+                  <a:schemeClr val="tx2"/>
+                </a:solidFill>
+                <a:latin typeface="Verdana"/>
+                <a:cs typeface="Verdana"/>
+              </a:rPr>
+              <a:t>Jenkins</a:t>
+            </a:r>
+            <a:endParaRPr lang="en-US" sz="2400" dirty="0">
+              <a:solidFill>
+                <a:schemeClr val="tx2"/>
+              </a:solidFill>
+              <a:latin typeface="Verdana"/>
+              <a:cs typeface="Verdana"/>
+            </a:endParaRPr>
+          </a:p>
+          <a:p>
+            <a:r>
+              <a:rPr lang="en-US" sz="2400" dirty="0" smtClean="0">
+                <a:solidFill>
+                  <a:schemeClr val="tx2"/>
+                </a:solidFill>
+                <a:latin typeface="Verdana"/>
+                <a:cs typeface="Verdana"/>
+              </a:rPr>
+              <a:t>Containers</a:t>
+            </a:r>
+            <a:r>
+              <a:rPr lang="en-US" sz="2400" dirty="0">
+                <a:solidFill>
+                  <a:schemeClr val="tx2"/>
+                </a:solidFill>
+                <a:latin typeface="Verdana"/>
+                <a:cs typeface="Verdana"/>
+              </a:rPr>
+              <a:t>: </a:t>
+            </a:r>
+            <a:r>
+              <a:rPr lang="en-US" sz="2400" dirty="0" smtClean="0">
+                <a:solidFill>
+                  <a:schemeClr val="tx2"/>
+                </a:solidFill>
+                <a:latin typeface="Verdana"/>
+                <a:cs typeface="Verdana"/>
+              </a:rPr>
+              <a:t>Docker</a:t>
+            </a:r>
+            <a:endParaRPr lang="en-US" sz="2400" dirty="0">
+              <a:solidFill>
+                <a:schemeClr val="tx2"/>
+              </a:solidFill>
+              <a:latin typeface="Verdana"/>
+              <a:cs typeface="Verdana"/>
+            </a:endParaRPr>
+          </a:p>
+          <a:p>
+            <a:r>
+              <a:rPr lang="en-US" sz="2400" dirty="0" smtClean="0">
+                <a:solidFill>
+                  <a:schemeClr val="tx2"/>
+                </a:solidFill>
+                <a:latin typeface="Verdana"/>
+                <a:cs typeface="Verdana"/>
+              </a:rPr>
+              <a:t>Code </a:t>
+            </a:r>
+            <a:r>
+              <a:rPr lang="en-US" sz="2400" dirty="0">
+                <a:solidFill>
+                  <a:schemeClr val="tx2"/>
+                </a:solidFill>
+                <a:latin typeface="Verdana"/>
+                <a:cs typeface="Verdana"/>
+              </a:rPr>
+              <a:t>review: </a:t>
+            </a:r>
+            <a:r>
+              <a:rPr lang="en-US" sz="2400" dirty="0" smtClean="0">
+                <a:solidFill>
+                  <a:schemeClr val="tx2"/>
+                </a:solidFill>
+                <a:latin typeface="Verdana"/>
+                <a:cs typeface="Verdana"/>
+              </a:rPr>
+              <a:t>ReviewBoard</a:t>
+            </a:r>
+            <a:endParaRPr lang="en-US" sz="2400" dirty="0">
+              <a:solidFill>
+                <a:schemeClr val="tx2"/>
+              </a:solidFill>
+              <a:latin typeface="Verdana"/>
+              <a:cs typeface="Verdana"/>
+            </a:endParaRPr>
+          </a:p>
+          <a:p>
+            <a:r>
+              <a:rPr lang="en-US" sz="2400" dirty="0" smtClean="0">
+                <a:solidFill>
+                  <a:schemeClr val="tx2"/>
+                </a:solidFill>
+                <a:latin typeface="Verdana"/>
+                <a:cs typeface="Verdana"/>
+              </a:rPr>
+              <a:t>Application </a:t>
+            </a:r>
+            <a:r>
+              <a:rPr lang="en-US" sz="2400" dirty="0">
+                <a:solidFill>
+                  <a:schemeClr val="tx2"/>
+                </a:solidFill>
+                <a:latin typeface="Verdana"/>
+                <a:cs typeface="Verdana"/>
+              </a:rPr>
+              <a:t>server: </a:t>
+            </a:r>
+            <a:r>
+              <a:rPr lang="en-US" sz="2400" dirty="0" smtClean="0">
+                <a:solidFill>
+                  <a:schemeClr val="tx2"/>
+                </a:solidFill>
+                <a:latin typeface="Verdana"/>
+                <a:cs typeface="Verdana"/>
+              </a:rPr>
+              <a:t>Jetty</a:t>
+            </a:r>
+            <a:endParaRPr lang="en-US" sz="2400" dirty="0">
+              <a:solidFill>
+                <a:schemeClr val="tx2"/>
+              </a:solidFill>
+              <a:latin typeface="Verdana"/>
+              <a:cs typeface="Verdana"/>
+            </a:endParaRPr>
+          </a:p>
+          <a:p>
+            <a:r>
+              <a:rPr lang="en-US" sz="2400" dirty="0" smtClean="0">
+                <a:solidFill>
+                  <a:schemeClr val="tx2"/>
+                </a:solidFill>
+                <a:latin typeface="Verdana"/>
+                <a:cs typeface="Verdana"/>
+              </a:rPr>
+              <a:t>High </a:t>
+            </a:r>
+            <a:r>
+              <a:rPr lang="en-US" sz="2400" dirty="0">
+                <a:solidFill>
+                  <a:schemeClr val="tx2"/>
+                </a:solidFill>
+                <a:latin typeface="Verdana"/>
+                <a:cs typeface="Verdana"/>
+              </a:rPr>
+              <a:t>availability: </a:t>
+            </a:r>
+            <a:r>
+              <a:rPr lang="en-US" sz="2400" dirty="0" err="1" smtClean="0">
+                <a:solidFill>
+                  <a:schemeClr val="tx2"/>
+                </a:solidFill>
+                <a:latin typeface="Verdana"/>
+                <a:cs typeface="Verdana"/>
+              </a:rPr>
+              <a:t>Nginx</a:t>
+            </a:r>
+            <a:r>
+              <a:rPr lang="en-US" sz="2400" dirty="0">
+                <a:solidFill>
+                  <a:schemeClr val="tx2"/>
+                </a:solidFill>
+                <a:latin typeface="Verdana"/>
+                <a:cs typeface="Verdana"/>
+              </a:rPr>
+              <a:t>, </a:t>
+            </a:r>
+            <a:r>
+              <a:rPr lang="en-US" sz="2400" dirty="0" err="1" smtClean="0">
+                <a:solidFill>
+                  <a:schemeClr val="tx2"/>
+                </a:solidFill>
+                <a:latin typeface="Verdana"/>
+                <a:cs typeface="Verdana"/>
+              </a:rPr>
+              <a:t>Etcd</a:t>
+            </a:r>
+            <a:r>
+              <a:rPr lang="en-US" sz="2400" dirty="0">
+                <a:solidFill>
+                  <a:schemeClr val="tx2"/>
+                </a:solidFill>
+                <a:latin typeface="Verdana"/>
+                <a:cs typeface="Verdana"/>
+              </a:rPr>
+              <a:t>, </a:t>
+            </a:r>
+            <a:r>
+              <a:rPr lang="en-US" sz="2400" dirty="0" err="1" smtClean="0">
+                <a:solidFill>
+                  <a:schemeClr val="tx2"/>
+                </a:solidFill>
+                <a:latin typeface="Verdana"/>
+                <a:cs typeface="Verdana"/>
+              </a:rPr>
+              <a:t>Etcdctl</a:t>
+            </a:r>
+            <a:r>
+              <a:rPr lang="en-US" sz="2400" dirty="0">
+                <a:solidFill>
+                  <a:schemeClr val="tx2"/>
+                </a:solidFill>
+                <a:latin typeface="Verdana"/>
+                <a:cs typeface="Verdana"/>
+              </a:rPr>
+              <a:t>, </a:t>
+            </a:r>
+            <a:r>
+              <a:rPr lang="en-US" sz="2400" dirty="0" err="1" smtClean="0">
+                <a:solidFill>
+                  <a:schemeClr val="tx2"/>
+                </a:solidFill>
+                <a:latin typeface="Verdana"/>
+                <a:cs typeface="Verdana"/>
+              </a:rPr>
+              <a:t>Confd</a:t>
+            </a:r>
+            <a:endParaRPr lang="en-US" sz="2400" dirty="0">
+              <a:solidFill>
+                <a:schemeClr val="tx2"/>
+              </a:solidFill>
+              <a:latin typeface="Verdana"/>
+              <a:cs typeface="Verdana"/>
+            </a:endParaRPr>
+          </a:p>
+          <a:p>
+            <a:r>
+              <a:rPr lang="en-US" sz="2400" dirty="0" smtClean="0">
+                <a:solidFill>
+                  <a:schemeClr val="tx2"/>
+                </a:solidFill>
+                <a:latin typeface="Verdana"/>
+                <a:cs typeface="Verdana"/>
+              </a:rPr>
+              <a:t>Orchestration: </a:t>
+            </a:r>
+            <a:r>
+              <a:rPr lang="en-US" sz="2400" dirty="0" smtClean="0">
+                <a:solidFill>
+                  <a:schemeClr val="tx2"/>
+                </a:solidFill>
+                <a:latin typeface="Verdana"/>
+                <a:cs typeface="Verdana"/>
+              </a:rPr>
+              <a:t>ElectricCommander</a:t>
+            </a:r>
+          </a:p>
+        </p:txBody>
+      </p:sp>
+    </p:spTree>
+    <p:extLst>
+      <p:ext uri="{BB962C8B-B14F-4D97-AF65-F5344CB8AC3E}">
+        <p14:creationId xmlns:p14="http://schemas.microsoft.com/office/powerpoint/2010/main" val="2697353015"/>
+      </p:ext>
+    </p:extLst>
+  </p:cSld>
+  <p:clrMapOvr>
+    <a:masterClrMapping/>
+  </p:clrMapOvr>
+  <mc:AlternateContent xmlns:mc="http://schemas.openxmlformats.org/markup-compatibility/2006">
+    <mc:Choice xmlns:p14="http://schemas.microsoft.com/office/powerpoint/2010/main" Requires="p14">
+      <p:transition spd="slow" p14:dur="2000"/>
+    </mc:Choice>
+    <mc:Fallback>
+      <p:transition xmlns:p14="http://schemas.microsoft.com/office/powerpoint/2010/main" spd="slow"/>
+    </mc:Fallback>
+  </mc:AlternateContent>
+  <p:timing>
+    <p:tnLst>
+      <p:par>
+        <p:cTn xmlns:p14="http://schemas.microsoft.com/office/powerpoint/2010/main" id="1" dur="indefinite" restart="never" nodeType="tmRoot"/>
+      </p:par>
+    </p:tnLst>
+  </p:timing>
+</p:sld>
+</file>
+
+<file path=ppt/slides/slide3.xml><?xml version="1.0" encoding="utf-8"?>
 <p:sld xmlns:a="http://schemas.openxmlformats.org/drawingml/2006/main" xmlns:r="http://schemas.openxmlformats.org/officeDocument/2006/relationships" xmlns:p="http://schemas.openxmlformats.org/presentationml/2006/main">
   <p:cSld>
     <p:spTree>
@@ -8091,126 +8528,6 @@
 </p:sld>
 </file>
 
-<file path=ppt/slides/slide3.xml><?xml version="1.0" encoding="utf-8"?>
-<p:sld xmlns:a="http://schemas.openxmlformats.org/drawingml/2006/main" xmlns:r="http://schemas.openxmlformats.org/officeDocument/2006/relationships" xmlns:p="http://schemas.openxmlformats.org/presentationml/2006/main">
-  <p:cSld>
-    <p:spTree>
-      <p:nvGrpSpPr>
-        <p:cNvPr id="1" name=""/>
-        <p:cNvGrpSpPr/>
-        <p:nvPr/>
-      </p:nvGrpSpPr>
-      <p:grpSpPr>
-        <a:xfrm>
-          <a:off x="0" y="0"/>
-          <a:ext cx="0" cy="0"/>
-          <a:chOff x="0" y="0"/>
-          <a:chExt cx="0" cy="0"/>
-        </a:xfrm>
-      </p:grpSpPr>
-      <p:sp>
-        <p:nvSpPr>
-          <p:cNvPr id="9" name="Rectangle 8"/>
-          <p:cNvSpPr/>
-          <p:nvPr/>
-        </p:nvSpPr>
-        <p:spPr>
-          <a:xfrm>
-            <a:off x="0" y="1086779"/>
-            <a:ext cx="9144000" cy="5771221"/>
-          </a:xfrm>
-          <a:prstGeom prst="rect">
-            <a:avLst/>
-          </a:prstGeom>
-          <a:solidFill>
-            <a:schemeClr val="bg1"/>
-          </a:solidFill>
-          <a:ln>
-            <a:solidFill>
-              <a:schemeClr val="bg1"/>
-            </a:solidFill>
-          </a:ln>
-          <a:effectLst/>
-        </p:spPr>
-        <p:style>
-          <a:lnRef idx="1">
-            <a:schemeClr val="accent1"/>
-          </a:lnRef>
-          <a:fillRef idx="3">
-            <a:schemeClr val="accent1"/>
-          </a:fillRef>
-          <a:effectRef idx="2">
-            <a:schemeClr val="accent1"/>
-          </a:effectRef>
-          <a:fontRef idx="minor">
-            <a:schemeClr val="lt1"/>
-          </a:fontRef>
-        </p:style>
-        <p:txBody>
-          <a:bodyPr rtlCol="0" anchor="ctr"/>
-          <a:lstStyle/>
-          <a:p>
-            <a:pPr algn="ctr"/>
-            <a:endParaRPr lang="en-US"/>
-          </a:p>
-        </p:txBody>
-      </p:sp>
-      <p:sp>
-        <p:nvSpPr>
-          <p:cNvPr id="3" name="Content Placeholder 2"/>
-          <p:cNvSpPr>
-            <a:spLocks noGrp="1"/>
-          </p:cNvSpPr>
-          <p:nvPr>
-            <p:ph idx="1"/>
-          </p:nvPr>
-        </p:nvSpPr>
-        <p:spPr>
-          <a:xfrm>
-            <a:off x="1849649" y="3223063"/>
-            <a:ext cx="5380066" cy="1429327"/>
-          </a:xfrm>
-        </p:spPr>
-        <p:txBody>
-          <a:bodyPr/>
-          <a:lstStyle/>
-          <a:p>
-            <a:pPr marL="0" indent="0">
-              <a:buNone/>
-            </a:pPr>
-            <a:r>
-              <a:rPr lang="en-US" sz="7200" dirty="0" smtClean="0">
-                <a:solidFill>
-                  <a:schemeClr val="tx2"/>
-                </a:solidFill>
-                <a:latin typeface="Verdana"/>
-                <a:cs typeface="Verdana"/>
-              </a:rPr>
-              <a:t>LIVE DEMO</a:t>
-            </a:r>
-          </a:p>
-        </p:txBody>
-      </p:sp>
-    </p:spTree>
-    <p:extLst>
-      <p:ext uri="{BB962C8B-B14F-4D97-AF65-F5344CB8AC3E}">
-        <p14:creationId xmlns:p14="http://schemas.microsoft.com/office/powerpoint/2010/main" val="2376373426"/>
-      </p:ext>
-    </p:extLst>
-  </p:cSld>
-  <p:clrMapOvr>
-    <a:masterClrMapping/>
-  </p:clrMapOvr>
-  <p:timing>
-    <p:tnLst>
-      <p:par>
-        <p:cTn xmlns:p14="http://schemas.microsoft.com/office/powerpoint/2010/main" id="1" dur="indefinite" restart="never" nodeType="tmRoot"/>
-      </p:par>
-    </p:tnLst>
-  </p:timing>
-</p:sld>
-</file>
-
 <file path=ppt/slides/slide4.xml><?xml version="1.0" encoding="utf-8"?>
 <p:sld xmlns:a="http://schemas.openxmlformats.org/drawingml/2006/main" xmlns:r="http://schemas.openxmlformats.org/officeDocument/2006/relationships" xmlns:p="http://schemas.openxmlformats.org/presentationml/2006/main">
   <p:cSld>
@@ -8277,40 +8594,6 @@
       </p:sp>
       <p:sp>
         <p:nvSpPr>
-          <p:cNvPr id="2" name="Title 1"/>
-          <p:cNvSpPr>
-            <a:spLocks noGrp="1"/>
-          </p:cNvSpPr>
-          <p:nvPr>
-            <p:ph type="title"/>
-          </p:nvPr>
-        </p:nvSpPr>
-        <p:spPr>
-          <a:xfrm>
-            <a:off x="310891" y="167912"/>
-            <a:ext cx="8375909" cy="767329"/>
-          </a:xfrm>
-        </p:spPr>
-        <p:txBody>
-          <a:bodyPr/>
-          <a:lstStyle/>
-          <a:p>
-            <a:r>
-              <a:rPr lang="en-US" sz="3200" dirty="0" smtClean="0">
-                <a:latin typeface="Verdana"/>
-                <a:cs typeface="Verdana"/>
-              </a:rPr>
-              <a:t>Conclusion</a:t>
-            </a:r>
-            <a:endParaRPr lang="en-US" sz="3200" dirty="0">
-              <a:latin typeface="Verdana"/>
-              <a:cs typeface="Verdana"/>
-            </a:endParaRPr>
-          </a:p>
-        </p:txBody>
-      </p:sp>
-      <p:sp>
-        <p:nvSpPr>
           <p:cNvPr id="3" name="Content Placeholder 2"/>
           <p:cNvSpPr>
             <a:spLocks noGrp="1"/>
@@ -8321,151 +8604,28 @@
         </p:nvSpPr>
         <p:spPr>
           <a:xfrm>
-            <a:off x="310891" y="1342569"/>
-            <a:ext cx="7904571" cy="4637810"/>
+            <a:off x="1849649" y="3223063"/>
+            <a:ext cx="5380066" cy="1429327"/>
           </a:xfrm>
         </p:spPr>
         <p:txBody>
           <a:bodyPr/>
           <a:lstStyle/>
           <a:p>
-            <a:r>
-              <a:rPr lang="en-US" sz="2400" b="1" dirty="0" smtClean="0">
+            <a:pPr marL="0" indent="0" algn="ctr">
+              <a:buNone/>
+            </a:pPr>
+            <a:r>
+              <a:rPr lang="en-US" sz="7200" dirty="0" smtClean="0">
                 <a:solidFill>
                   <a:schemeClr val="tx2"/>
                 </a:solidFill>
                 <a:latin typeface="Verdana"/>
                 <a:cs typeface="Verdana"/>
               </a:rPr>
-              <a:t>Novelty </a:t>
-            </a:r>
-            <a:r>
-              <a:rPr lang="en-US" sz="2400" dirty="0" smtClean="0">
-                <a:solidFill>
-                  <a:schemeClr val="tx2"/>
-                </a:solidFill>
-                <a:latin typeface="Verdana"/>
-                <a:cs typeface="Verdana"/>
-              </a:rPr>
-              <a:t>– orchestration is on the </a:t>
-            </a:r>
-            <a:r>
-              <a:rPr lang="en-US" sz="2400" dirty="0" err="1" smtClean="0">
-                <a:solidFill>
-                  <a:schemeClr val="tx2"/>
-                </a:solidFill>
-                <a:latin typeface="Verdana"/>
-                <a:cs typeface="Verdana"/>
-              </a:rPr>
-              <a:t>Docker</a:t>
-            </a:r>
-            <a:r>
-              <a:rPr lang="en-US" sz="2400" dirty="0" smtClean="0">
-                <a:solidFill>
-                  <a:schemeClr val="tx2"/>
-                </a:solidFill>
-                <a:latin typeface="Verdana"/>
-                <a:cs typeface="Verdana"/>
-              </a:rPr>
-              <a:t> roadmap</a:t>
-            </a:r>
-          </a:p>
-          <a:p>
-            <a:r>
-              <a:rPr lang="en-US" sz="2400" b="1" dirty="0" smtClean="0">
-                <a:solidFill>
-                  <a:schemeClr val="tx2"/>
-                </a:solidFill>
-                <a:latin typeface="Verdana"/>
-                <a:cs typeface="Verdana"/>
-              </a:rPr>
-              <a:t>Fit </a:t>
-            </a:r>
-            <a:r>
-              <a:rPr lang="en-US" sz="2400" dirty="0" smtClean="0">
-                <a:solidFill>
-                  <a:schemeClr val="tx2"/>
-                </a:solidFill>
-                <a:latin typeface="Verdana"/>
-                <a:cs typeface="Verdana"/>
-              </a:rPr>
-              <a:t>– consistent deploy throughout the SDLC means riskless deploy to production</a:t>
-            </a:r>
-          </a:p>
-          <a:p>
-            <a:r>
-              <a:rPr lang="en-US" sz="2400" b="1" dirty="0" smtClean="0">
-                <a:solidFill>
-                  <a:schemeClr val="tx2"/>
-                </a:solidFill>
-                <a:latin typeface="Verdana"/>
-                <a:cs typeface="Verdana"/>
-              </a:rPr>
-              <a:t>Efficiency </a:t>
-            </a:r>
-            <a:r>
-              <a:rPr lang="en-US" sz="2400" dirty="0" smtClean="0">
-                <a:solidFill>
-                  <a:schemeClr val="tx2"/>
-                </a:solidFill>
-                <a:latin typeface="Verdana"/>
-                <a:cs typeface="Verdana"/>
-              </a:rPr>
-              <a:t>– </a:t>
-            </a:r>
-            <a:r>
-              <a:rPr lang="en-US" sz="2400" dirty="0" err="1" smtClean="0">
-                <a:solidFill>
-                  <a:schemeClr val="tx2"/>
-                </a:solidFill>
-                <a:latin typeface="Verdana"/>
-                <a:cs typeface="Verdana"/>
-              </a:rPr>
-              <a:t>Docker</a:t>
-            </a:r>
-            <a:r>
-              <a:rPr lang="en-US" sz="2400" dirty="0" smtClean="0">
-                <a:solidFill>
-                  <a:schemeClr val="tx2"/>
-                </a:solidFill>
-                <a:latin typeface="Verdana"/>
-                <a:cs typeface="Verdana"/>
-              </a:rPr>
-              <a:t> is an order of magnitude faster than traditional VM deployments</a:t>
-            </a:r>
-          </a:p>
-          <a:p>
-            <a:r>
-              <a:rPr lang="en-US" sz="2400" b="1" dirty="0" smtClean="0">
-                <a:solidFill>
-                  <a:schemeClr val="tx2"/>
-                </a:solidFill>
-                <a:latin typeface="Verdana"/>
-                <a:cs typeface="Verdana"/>
-              </a:rPr>
-              <a:t>Integration </a:t>
-            </a:r>
-            <a:r>
-              <a:rPr lang="en-US" sz="2400" dirty="0" smtClean="0">
-                <a:solidFill>
-                  <a:schemeClr val="tx2"/>
-                </a:solidFill>
-                <a:latin typeface="Verdana"/>
-                <a:cs typeface="Verdana"/>
-              </a:rPr>
-              <a:t>– this is the primary focus of the </a:t>
-            </a:r>
-            <a:r>
-              <a:rPr lang="en-US" sz="2400" dirty="0" err="1" smtClean="0">
-                <a:solidFill>
-                  <a:schemeClr val="tx2"/>
-                </a:solidFill>
-                <a:latin typeface="Verdana"/>
-                <a:cs typeface="Verdana"/>
-              </a:rPr>
-              <a:t>hackathon</a:t>
-            </a:r>
-            <a:endParaRPr lang="en-US" sz="2400" dirty="0" smtClean="0">
+              <a:t>DEMO</a:t>
+            </a:r>
+            <a:endParaRPr lang="en-US" sz="7200" dirty="0" smtClean="0">
               <a:solidFill>
                 <a:schemeClr val="tx2"/>
               </a:solidFill>
@@ -8473,110 +8633,12 @@
               <a:cs typeface="Verdana"/>
             </a:endParaRPr>
           </a:p>
-          <a:p>
-            <a:r>
-              <a:rPr lang="en-US" sz="2400" b="1" dirty="0">
-                <a:solidFill>
-                  <a:schemeClr val="tx2"/>
-                </a:solidFill>
-                <a:latin typeface="Verdana"/>
-                <a:cs typeface="Verdana"/>
-              </a:rPr>
-              <a:t>Transparency</a:t>
-            </a:r>
-            <a:r>
-              <a:rPr lang="en-US" sz="2400" dirty="0">
-                <a:solidFill>
-                  <a:schemeClr val="tx2"/>
-                </a:solidFill>
-                <a:latin typeface="Verdana"/>
-                <a:cs typeface="Verdana"/>
-              </a:rPr>
-              <a:t> </a:t>
-            </a:r>
-            <a:r>
-              <a:rPr lang="en-US" sz="2400" dirty="0" smtClean="0">
-                <a:solidFill>
-                  <a:schemeClr val="tx2"/>
-                </a:solidFill>
-                <a:latin typeface="Verdana"/>
-                <a:cs typeface="Verdana"/>
-              </a:rPr>
-              <a:t>– </a:t>
-            </a:r>
-            <a:r>
-              <a:rPr lang="en-US" sz="2400" dirty="0" err="1" smtClean="0">
-                <a:solidFill>
-                  <a:schemeClr val="tx2"/>
-                </a:solidFill>
-                <a:latin typeface="Verdana"/>
-                <a:cs typeface="Verdana"/>
-              </a:rPr>
-              <a:t>github.com</a:t>
-            </a:r>
-            <a:r>
-              <a:rPr lang="en-US" sz="2400" dirty="0">
-                <a:solidFill>
-                  <a:schemeClr val="tx2"/>
-                </a:solidFill>
-                <a:latin typeface="Verdana"/>
-                <a:cs typeface="Verdana"/>
-              </a:rPr>
-              <a:t>/</a:t>
-            </a:r>
-            <a:r>
-              <a:rPr lang="en-US" sz="2400" dirty="0" err="1">
-                <a:solidFill>
-                  <a:schemeClr val="tx2"/>
-                </a:solidFill>
-                <a:latin typeface="Verdana"/>
-                <a:cs typeface="Verdana"/>
-              </a:rPr>
-              <a:t>electriccommunity</a:t>
-            </a:r>
-            <a:r>
-              <a:rPr lang="en-US" sz="2400" dirty="0">
-                <a:solidFill>
-                  <a:schemeClr val="tx2"/>
-                </a:solidFill>
-                <a:latin typeface="Verdana"/>
-                <a:cs typeface="Verdana"/>
-              </a:rPr>
-              <a:t>/</a:t>
-            </a:r>
-            <a:r>
-              <a:rPr lang="en-US" sz="2400" dirty="0" err="1" smtClean="0">
-                <a:solidFill>
-                  <a:schemeClr val="tx2"/>
-                </a:solidFill>
-                <a:latin typeface="Verdana"/>
-                <a:cs typeface="Verdana"/>
-              </a:rPr>
-              <a:t>dockercon</a:t>
-            </a:r>
-            <a:endParaRPr lang="en-US" sz="2400" dirty="0" smtClean="0">
-              <a:solidFill>
-                <a:schemeClr val="tx2"/>
-              </a:solidFill>
-              <a:latin typeface="Verdana"/>
-              <a:cs typeface="Verdana"/>
-            </a:endParaRPr>
-          </a:p>
-          <a:p>
-            <a:endParaRPr lang="en-US" sz="2400" dirty="0" smtClean="0">
-              <a:solidFill>
-                <a:schemeClr val="tx2"/>
-              </a:solidFill>
-              <a:latin typeface="Verdana"/>
-              <a:cs typeface="Verdana"/>
-            </a:endParaRPr>
-          </a:p>
         </p:txBody>
       </p:sp>
     </p:spTree>
     <p:extLst>
       <p:ext uri="{BB962C8B-B14F-4D97-AF65-F5344CB8AC3E}">
-        <p14:creationId xmlns:p14="http://schemas.microsoft.com/office/powerpoint/2010/main" val="1443910395"/>
+        <p14:creationId xmlns:p14="http://schemas.microsoft.com/office/powerpoint/2010/main" val="2376373426"/>
       </p:ext>
     </p:extLst>
   </p:cSld>
@@ -8682,7 +8744,7 @@
                 <a:latin typeface="Verdana"/>
                 <a:cs typeface="Verdana"/>
               </a:rPr>
-              <a:t>Technologies used</a:t>
+              <a:t>Conclusion</a:t>
             </a:r>
             <a:endParaRPr lang="en-US" sz="3200" dirty="0">
               <a:latin typeface="Verdana"/>
@@ -8719,29 +8781,75 @@
                 <a:latin typeface="Verdana"/>
                 <a:cs typeface="Verdana"/>
               </a:rPr>
-              <a:t>Source </a:t>
-            </a:r>
-            <a:r>
-              <a:rPr lang="en-US" sz="2400" dirty="0">
+              <a:t>Consistent </a:t>
+            </a:r>
+            <a:r>
+              <a:rPr lang="en-US" sz="2400" dirty="0" smtClean="0">
                 <a:solidFill>
                   <a:schemeClr val="tx2"/>
                 </a:solidFill>
                 <a:latin typeface="Verdana"/>
                 <a:cs typeface="Verdana"/>
               </a:rPr>
-              <a:t>control: </a:t>
-            </a:r>
-            <a:r>
-              <a:rPr lang="en-US" sz="2400" dirty="0" err="1" smtClean="0">
+              <a:t>deploy throughout the SDLC means riskless deploy to production</a:t>
+            </a:r>
+          </a:p>
+          <a:p>
+            <a:r>
+              <a:rPr lang="en-US" sz="2400" dirty="0" smtClean="0">
                 <a:solidFill>
                   <a:schemeClr val="tx2"/>
                 </a:solidFill>
                 <a:latin typeface="Verdana"/>
                 <a:cs typeface="Verdana"/>
               </a:rPr>
-              <a:t>GitHub</a:t>
-            </a:r>
-            <a:endParaRPr lang="en-US" sz="2400" dirty="0">
+              <a:t>Docker </a:t>
+            </a:r>
+            <a:r>
+              <a:rPr lang="en-US" sz="2400" dirty="0" smtClean="0">
+                <a:solidFill>
+                  <a:schemeClr val="tx2"/>
+                </a:solidFill>
+                <a:latin typeface="Verdana"/>
+                <a:cs typeface="Verdana"/>
+              </a:rPr>
+              <a:t>is an order of magnitude faster than traditional VM deployments</a:t>
+            </a:r>
+          </a:p>
+          <a:p>
+            <a:r>
+              <a:rPr lang="en-US" sz="2400" dirty="0" smtClean="0">
+                <a:solidFill>
+                  <a:schemeClr val="tx2"/>
+                </a:solidFill>
+                <a:latin typeface="Verdana"/>
+                <a:cs typeface="Verdana"/>
+              </a:rPr>
+              <a:t>github.com</a:t>
+            </a:r>
+            <a:r>
+              <a:rPr lang="en-US" sz="2400" dirty="0">
+                <a:solidFill>
+                  <a:schemeClr val="tx2"/>
+                </a:solidFill>
+                <a:latin typeface="Verdana"/>
+                <a:cs typeface="Verdana"/>
+              </a:rPr>
+              <a:t>/electriccommunity/</a:t>
+            </a:r>
+            <a:r>
+              <a:rPr lang="en-US" sz="2400" dirty="0" smtClean="0">
+                <a:solidFill>
+                  <a:schemeClr val="tx2"/>
+                </a:solidFill>
+                <a:latin typeface="Verdana"/>
+                <a:cs typeface="Verdana"/>
+              </a:rPr>
+              <a:t>dockercon</a:t>
+            </a:r>
+          </a:p>
+          <a:p>
+            <a:endParaRPr lang="en-US" sz="2400" dirty="0" smtClean="0">
               <a:solidFill>
                 <a:schemeClr val="tx2"/>
               </a:solidFill>
@@ -8749,335 +8857,18 @@
               <a:cs typeface="Verdana"/>
             </a:endParaRPr>
           </a:p>
-          <a:p>
-            <a:r>
-              <a:rPr lang="en-US" sz="2400" dirty="0" smtClean="0">
-                <a:solidFill>
-                  <a:schemeClr val="tx2"/>
-                </a:solidFill>
-                <a:latin typeface="Verdana"/>
-                <a:cs typeface="Verdana"/>
-              </a:rPr>
-              <a:t>Build</a:t>
-            </a:r>
-            <a:r>
-              <a:rPr lang="en-US" sz="2400" dirty="0">
-                <a:solidFill>
-                  <a:schemeClr val="tx2"/>
-                </a:solidFill>
-                <a:latin typeface="Verdana"/>
-                <a:cs typeface="Verdana"/>
-              </a:rPr>
-              <a:t>: </a:t>
-            </a:r>
-            <a:r>
-              <a:rPr lang="en-US" sz="2400" dirty="0" smtClean="0">
-                <a:solidFill>
-                  <a:schemeClr val="tx2"/>
-                </a:solidFill>
-                <a:latin typeface="Verdana"/>
-                <a:cs typeface="Verdana"/>
-              </a:rPr>
-              <a:t>Jenkins</a:t>
-            </a:r>
-            <a:endParaRPr lang="en-US" sz="2400" dirty="0">
-              <a:solidFill>
-                <a:schemeClr val="tx2"/>
-              </a:solidFill>
-              <a:latin typeface="Verdana"/>
-              <a:cs typeface="Verdana"/>
-            </a:endParaRPr>
-          </a:p>
-          <a:p>
-            <a:r>
-              <a:rPr lang="en-US" sz="2400" dirty="0" smtClean="0">
-                <a:solidFill>
-                  <a:schemeClr val="tx2"/>
-                </a:solidFill>
-                <a:latin typeface="Verdana"/>
-                <a:cs typeface="Verdana"/>
-              </a:rPr>
-              <a:t>Containers</a:t>
-            </a:r>
-            <a:r>
-              <a:rPr lang="en-US" sz="2400" dirty="0">
-                <a:solidFill>
-                  <a:schemeClr val="tx2"/>
-                </a:solidFill>
-                <a:latin typeface="Verdana"/>
-                <a:cs typeface="Verdana"/>
-              </a:rPr>
-              <a:t>: </a:t>
-            </a:r>
-            <a:r>
-              <a:rPr lang="en-US" sz="2400" dirty="0" err="1" smtClean="0">
-                <a:solidFill>
-                  <a:schemeClr val="tx2"/>
-                </a:solidFill>
-                <a:latin typeface="Verdana"/>
-                <a:cs typeface="Verdana"/>
-              </a:rPr>
-              <a:t>Docker</a:t>
-            </a:r>
-            <a:endParaRPr lang="en-US" sz="2400" dirty="0">
-              <a:solidFill>
-                <a:schemeClr val="tx2"/>
-              </a:solidFill>
-              <a:latin typeface="Verdana"/>
-              <a:cs typeface="Verdana"/>
-            </a:endParaRPr>
-          </a:p>
-          <a:p>
-            <a:r>
-              <a:rPr lang="en-US" sz="2400" dirty="0" smtClean="0">
-                <a:solidFill>
-                  <a:schemeClr val="tx2"/>
-                </a:solidFill>
-                <a:latin typeface="Verdana"/>
-                <a:cs typeface="Verdana"/>
-              </a:rPr>
-              <a:t>Code </a:t>
-            </a:r>
-            <a:r>
-              <a:rPr lang="en-US" sz="2400" dirty="0">
-                <a:solidFill>
-                  <a:schemeClr val="tx2"/>
-                </a:solidFill>
-                <a:latin typeface="Verdana"/>
-                <a:cs typeface="Verdana"/>
-              </a:rPr>
-              <a:t>review: </a:t>
-            </a:r>
-            <a:r>
-              <a:rPr lang="en-US" sz="2400" dirty="0" smtClean="0">
-                <a:solidFill>
-                  <a:schemeClr val="tx2"/>
-                </a:solidFill>
-                <a:latin typeface="Verdana"/>
-                <a:cs typeface="Verdana"/>
-              </a:rPr>
-              <a:t>ReviewBoard</a:t>
-            </a:r>
-            <a:endParaRPr lang="en-US" sz="2400" dirty="0">
-              <a:solidFill>
-                <a:schemeClr val="tx2"/>
-              </a:solidFill>
-              <a:latin typeface="Verdana"/>
-              <a:cs typeface="Verdana"/>
-            </a:endParaRPr>
-          </a:p>
-          <a:p>
-            <a:r>
-              <a:rPr lang="en-US" sz="2400" dirty="0" smtClean="0">
-                <a:solidFill>
-                  <a:schemeClr val="tx2"/>
-                </a:solidFill>
-                <a:latin typeface="Verdana"/>
-                <a:cs typeface="Verdana"/>
-              </a:rPr>
-              <a:t>Application </a:t>
-            </a:r>
-            <a:r>
-              <a:rPr lang="en-US" sz="2400" dirty="0">
-                <a:solidFill>
-                  <a:schemeClr val="tx2"/>
-                </a:solidFill>
-                <a:latin typeface="Verdana"/>
-                <a:cs typeface="Verdana"/>
-              </a:rPr>
-              <a:t>server: </a:t>
-            </a:r>
-            <a:r>
-              <a:rPr lang="en-US" sz="2400" dirty="0" smtClean="0">
-                <a:solidFill>
-                  <a:schemeClr val="tx2"/>
-                </a:solidFill>
-                <a:latin typeface="Verdana"/>
-                <a:cs typeface="Verdana"/>
-              </a:rPr>
-              <a:t>Jetty</a:t>
-            </a:r>
-            <a:endParaRPr lang="en-US" sz="2400" dirty="0">
-              <a:solidFill>
-                <a:schemeClr val="tx2"/>
-              </a:solidFill>
-              <a:latin typeface="Verdana"/>
-              <a:cs typeface="Verdana"/>
-            </a:endParaRPr>
-          </a:p>
-          <a:p>
-            <a:r>
-              <a:rPr lang="en-US" sz="2400" dirty="0" smtClean="0">
-                <a:solidFill>
-                  <a:schemeClr val="tx2"/>
-                </a:solidFill>
-                <a:latin typeface="Verdana"/>
-                <a:cs typeface="Verdana"/>
-              </a:rPr>
-              <a:t>High </a:t>
-            </a:r>
-            <a:r>
-              <a:rPr lang="en-US" sz="2400" dirty="0">
-                <a:solidFill>
-                  <a:schemeClr val="tx2"/>
-                </a:solidFill>
-                <a:latin typeface="Verdana"/>
-                <a:cs typeface="Verdana"/>
-              </a:rPr>
-              <a:t>availability: </a:t>
-            </a:r>
-            <a:r>
-              <a:rPr lang="en-US" sz="2400" dirty="0" err="1" smtClean="0">
-                <a:solidFill>
-                  <a:schemeClr val="tx2"/>
-                </a:solidFill>
-                <a:latin typeface="Verdana"/>
-                <a:cs typeface="Verdana"/>
-              </a:rPr>
-              <a:t>Nginx</a:t>
-            </a:r>
-            <a:r>
-              <a:rPr lang="en-US" sz="2400" dirty="0">
-                <a:solidFill>
-                  <a:schemeClr val="tx2"/>
-                </a:solidFill>
-                <a:latin typeface="Verdana"/>
-                <a:cs typeface="Verdana"/>
-              </a:rPr>
-              <a:t>, </a:t>
-            </a:r>
-            <a:r>
-              <a:rPr lang="en-US" sz="2400" dirty="0" err="1" smtClean="0">
-                <a:solidFill>
-                  <a:schemeClr val="tx2"/>
-                </a:solidFill>
-                <a:latin typeface="Verdana"/>
-                <a:cs typeface="Verdana"/>
-              </a:rPr>
-              <a:t>Etcd</a:t>
-            </a:r>
-            <a:r>
-              <a:rPr lang="en-US" sz="2400" dirty="0">
-                <a:solidFill>
-                  <a:schemeClr val="tx2"/>
-                </a:solidFill>
-                <a:latin typeface="Verdana"/>
-                <a:cs typeface="Verdana"/>
-              </a:rPr>
-              <a:t>, </a:t>
-            </a:r>
-            <a:r>
-              <a:rPr lang="en-US" sz="2400" dirty="0" err="1" smtClean="0">
-                <a:solidFill>
-                  <a:schemeClr val="tx2"/>
-                </a:solidFill>
-                <a:latin typeface="Verdana"/>
-                <a:cs typeface="Verdana"/>
-              </a:rPr>
-              <a:t>Etcdctl</a:t>
-            </a:r>
-            <a:r>
-              <a:rPr lang="en-US" sz="2400" dirty="0">
-                <a:solidFill>
-                  <a:schemeClr val="tx2"/>
-                </a:solidFill>
-                <a:latin typeface="Verdana"/>
-                <a:cs typeface="Verdana"/>
-              </a:rPr>
-              <a:t>, </a:t>
-            </a:r>
-            <a:r>
-              <a:rPr lang="en-US" sz="2400" dirty="0" err="1" smtClean="0">
-                <a:solidFill>
-                  <a:schemeClr val="tx2"/>
-                </a:solidFill>
-                <a:latin typeface="Verdana"/>
-                <a:cs typeface="Verdana"/>
-              </a:rPr>
-              <a:t>Confd</a:t>
-            </a:r>
-            <a:endParaRPr lang="en-US" sz="2400" dirty="0">
-              <a:solidFill>
-                <a:schemeClr val="tx2"/>
-              </a:solidFill>
-              <a:latin typeface="Verdana"/>
-              <a:cs typeface="Verdana"/>
-            </a:endParaRPr>
-          </a:p>
-          <a:p>
-            <a:r>
-              <a:rPr lang="en-US" sz="2400" dirty="0" smtClean="0">
-                <a:solidFill>
-                  <a:schemeClr val="tx2"/>
-                </a:solidFill>
-                <a:latin typeface="Verdana"/>
-                <a:cs typeface="Verdana"/>
-              </a:rPr>
-              <a:t>Artifact </a:t>
-            </a:r>
-            <a:r>
-              <a:rPr lang="en-US" sz="2400" dirty="0">
-                <a:solidFill>
-                  <a:schemeClr val="tx2"/>
-                </a:solidFill>
-                <a:latin typeface="Verdana"/>
-                <a:cs typeface="Verdana"/>
-              </a:rPr>
-              <a:t>repository: ElectricCommander</a:t>
-            </a:r>
-          </a:p>
-          <a:p>
-            <a:r>
-              <a:rPr lang="en-US" sz="2400" dirty="0" smtClean="0">
-                <a:solidFill>
-                  <a:schemeClr val="tx2"/>
-                </a:solidFill>
-                <a:latin typeface="Verdana"/>
-                <a:cs typeface="Verdana"/>
-              </a:rPr>
-              <a:t>Orchestration</a:t>
-            </a:r>
-            <a:r>
-              <a:rPr lang="en-US" sz="2400" dirty="0">
-                <a:solidFill>
-                  <a:schemeClr val="tx2"/>
-                </a:solidFill>
-                <a:latin typeface="Verdana"/>
-                <a:cs typeface="Verdana"/>
-              </a:rPr>
-              <a:t>: </a:t>
-            </a:r>
-            <a:r>
-              <a:rPr lang="en-US" sz="2400" dirty="0" smtClean="0">
-                <a:solidFill>
-                  <a:schemeClr val="tx2"/>
-                </a:solidFill>
-                <a:latin typeface="Verdana"/>
-                <a:cs typeface="Verdana"/>
-              </a:rPr>
-              <a:t>ElectricCommander</a:t>
-            </a:r>
-          </a:p>
         </p:txBody>
       </p:sp>
     </p:spTree>
     <p:extLst>
       <p:ext uri="{BB962C8B-B14F-4D97-AF65-F5344CB8AC3E}">
-        <p14:creationId xmlns:p14="http://schemas.microsoft.com/office/powerpoint/2010/main" val="2697353015"/>
+        <p14:creationId xmlns:p14="http://schemas.microsoft.com/office/powerpoint/2010/main" val="1443910395"/>
       </p:ext>
     </p:extLst>
   </p:cSld>
   <p:clrMapOvr>
     <a:masterClrMapping/>
   </p:clrMapOvr>
-  <mc:AlternateContent xmlns:mc="http://schemas.openxmlformats.org/markup-compatibility/2006">
-    <mc:Choice xmlns:p14="http://schemas.microsoft.com/office/powerpoint/2010/main" Requires="p14">
-      <p:transition spd="slow" p14:dur="2000"/>
-    </mc:Choice>
-    <mc:Fallback>
-      <p:transition xmlns:p14="http://schemas.microsoft.com/office/powerpoint/2010/main" spd="slow"/>
-    </mc:Fallback>
-  </mc:AlternateContent>
   <p:timing>
     <p:tnLst>
       <p:par>

</xml_diff>